<commit_message>
Presentation added with updates
</commit_message>
<xml_diff>
--- a/ibmProjectPresentation.pptx
+++ b/ibmProjectPresentation.pptx
@@ -3857,7 +3857,7 @@
         <p:spPr/>
         <p:txBody>
           <a:bodyPr>
-            <a:normAutofit fontScale="92500" lnSpcReduction="10000"/>
+            <a:normAutofit fontScale="62500" lnSpcReduction="20000"/>
           </a:bodyPr>
           <a:lstStyle/>
           <a:p>
@@ -3884,6 +3884,41 @@
             <a:r>
               <a:rPr lang="en-US" dirty="0"/>
               <a:t>Research Supervisor – Senthil Kumar T</a:t>
+            </a:r>
+          </a:p>
+          <a:p>
+            <a:r>
+              <a:rPr lang="en-US" dirty="0"/>
+              <a:t>In support with : </a:t>
+            </a:r>
+            <a:r>
+              <a:rPr lang="en-US" dirty="0" err="1"/>
+              <a:t>Sulakshan</a:t>
+            </a:r>
+            <a:r>
+              <a:rPr lang="en-US" dirty="0"/>
+              <a:t> </a:t>
+            </a:r>
+            <a:r>
+              <a:rPr lang="en-US" dirty="0" err="1"/>
+              <a:t>Vajipayajula</a:t>
+            </a:r>
+            <a:endParaRPr lang="en-US" dirty="0"/>
+          </a:p>
+          <a:p>
+            <a:r>
+              <a:rPr lang="en-US" dirty="0"/>
+              <a:t>Architect CTO Office, IMB Security Bangalore – </a:t>
+            </a:r>
+            <a:r>
+              <a:rPr lang="en-US" dirty="0">
+                <a:hlinkClick r:id="rId2"/>
+              </a:rPr>
+              <a:t>svajipay@in.ibm.com</a:t>
+            </a:r>
+            <a:r>
+              <a:rPr lang="en-US" dirty="0"/>
+              <a:t> </a:t>
             </a:r>
           </a:p>
         </p:txBody>

</xml_diff>